<commit_message>
images.pptx in branch develop changed
</commit_message>
<xml_diff>
--- a/images.pptx
+++ b/images.pptx
@@ -3555,8 +3555,8 @@
         </p:blipFill>
         <p:spPr>
           <a:xfrm>
-            <a:off x="3745535" y="778363"/>
-            <a:ext cx="2903392" cy="4351338"/>
+            <a:off x="3628303" y="794848"/>
+            <a:ext cx="5078035" cy="5268303"/>
           </a:xfrm>
         </p:spPr>
       </p:pic>

</xml_diff>